<commit_message>
Release: Splash screen for 0.3
</commit_message>
<xml_diff>
--- a/ca.mcgill.cs.swevo.qualyzer/splash.pptx
+++ b/ca.mcgill.cs.swevo.qualyzer/splash.pptx
@@ -289,7 +289,7 @@
             <a:fld id="{77CFC0F2-488D-422B-ADC0-4A8D12F54259}" type="datetimeFigureOut">
               <a:rPr lang="en-US" smtClean="0"/>
               <a:pPr/>
-              <a:t>7/7/2010</a:t>
+              <a:t>8/3/2010</a:t>
             </a:fld>
             <a:endParaRPr lang="en-US"/>
           </a:p>
@@ -456,7 +456,7 @@
             <a:fld id="{77CFC0F2-488D-422B-ADC0-4A8D12F54259}" type="datetimeFigureOut">
               <a:rPr lang="en-US" smtClean="0"/>
               <a:pPr/>
-              <a:t>7/7/2010</a:t>
+              <a:t>8/3/2010</a:t>
             </a:fld>
             <a:endParaRPr lang="en-US"/>
           </a:p>
@@ -633,7 +633,7 @@
             <a:fld id="{77CFC0F2-488D-422B-ADC0-4A8D12F54259}" type="datetimeFigureOut">
               <a:rPr lang="en-US" smtClean="0"/>
               <a:pPr/>
-              <a:t>7/7/2010</a:t>
+              <a:t>8/3/2010</a:t>
             </a:fld>
             <a:endParaRPr lang="en-US"/>
           </a:p>
@@ -800,7 +800,7 @@
             <a:fld id="{77CFC0F2-488D-422B-ADC0-4A8D12F54259}" type="datetimeFigureOut">
               <a:rPr lang="en-US" smtClean="0"/>
               <a:pPr/>
-              <a:t>7/7/2010</a:t>
+              <a:t>8/3/2010</a:t>
             </a:fld>
             <a:endParaRPr lang="en-US"/>
           </a:p>
@@ -1043,7 +1043,7 @@
             <a:fld id="{77CFC0F2-488D-422B-ADC0-4A8D12F54259}" type="datetimeFigureOut">
               <a:rPr lang="en-US" smtClean="0"/>
               <a:pPr/>
-              <a:t>7/7/2010</a:t>
+              <a:t>8/3/2010</a:t>
             </a:fld>
             <a:endParaRPr lang="en-US"/>
           </a:p>
@@ -1328,7 +1328,7 @@
             <a:fld id="{77CFC0F2-488D-422B-ADC0-4A8D12F54259}" type="datetimeFigureOut">
               <a:rPr lang="en-US" smtClean="0"/>
               <a:pPr/>
-              <a:t>7/7/2010</a:t>
+              <a:t>8/3/2010</a:t>
             </a:fld>
             <a:endParaRPr lang="en-US"/>
           </a:p>
@@ -1747,7 +1747,7 @@
             <a:fld id="{77CFC0F2-488D-422B-ADC0-4A8D12F54259}" type="datetimeFigureOut">
               <a:rPr lang="en-US" smtClean="0"/>
               <a:pPr/>
-              <a:t>7/7/2010</a:t>
+              <a:t>8/3/2010</a:t>
             </a:fld>
             <a:endParaRPr lang="en-US"/>
           </a:p>
@@ -1862,7 +1862,7 @@
             <a:fld id="{77CFC0F2-488D-422B-ADC0-4A8D12F54259}" type="datetimeFigureOut">
               <a:rPr lang="en-US" smtClean="0"/>
               <a:pPr/>
-              <a:t>7/7/2010</a:t>
+              <a:t>8/3/2010</a:t>
             </a:fld>
             <a:endParaRPr lang="en-US"/>
           </a:p>
@@ -1954,7 +1954,7 @@
             <a:fld id="{77CFC0F2-488D-422B-ADC0-4A8D12F54259}" type="datetimeFigureOut">
               <a:rPr lang="en-US" smtClean="0"/>
               <a:pPr/>
-              <a:t>7/7/2010</a:t>
+              <a:t>8/3/2010</a:t>
             </a:fld>
             <a:endParaRPr lang="en-US"/>
           </a:p>
@@ -2228,7 +2228,7 @@
             <a:fld id="{77CFC0F2-488D-422B-ADC0-4A8D12F54259}" type="datetimeFigureOut">
               <a:rPr lang="en-US" smtClean="0"/>
               <a:pPr/>
-              <a:t>7/7/2010</a:t>
+              <a:t>8/3/2010</a:t>
             </a:fld>
             <a:endParaRPr lang="en-US"/>
           </a:p>
@@ -2478,7 +2478,7 @@
             <a:fld id="{77CFC0F2-488D-422B-ADC0-4A8D12F54259}" type="datetimeFigureOut">
               <a:rPr lang="en-US" smtClean="0"/>
               <a:pPr/>
-              <a:t>7/7/2010</a:t>
+              <a:t>8/3/2010</a:t>
             </a:fld>
             <a:endParaRPr lang="en-US"/>
           </a:p>
@@ -2688,7 +2688,7 @@
             <a:fld id="{77CFC0F2-488D-422B-ADC0-4A8D12F54259}" type="datetimeFigureOut">
               <a:rPr lang="en-US" smtClean="0"/>
               <a:pPr/>
-              <a:t>7/7/2010</a:t>
+              <a:t>8/3/2010</a:t>
             </a:fld>
             <a:endParaRPr lang="en-US"/>
           </a:p>
@@ -3285,7 +3285,7 @@
                   </a:schemeClr>
                 </a:solidFill>
               </a:rPr>
-              <a:t>0.2.0</a:t>
+              <a:t>0.3.0</a:t>
             </a:r>
             <a:endParaRPr lang="en-US" sz="1050" dirty="0">
               <a:solidFill>

</xml_diff>

<commit_message>
Release: Incremented to 1.0.0 the splash screen, about box, and plug-in version.
</commit_message>
<xml_diff>
--- a/ca.mcgill.cs.swevo.qualyzer/splash.pptx
+++ b/ca.mcgill.cs.swevo.qualyzer/splash.pptx
@@ -289,7 +289,7 @@
             <a:fld id="{77CFC0F2-488D-422B-ADC0-4A8D12F54259}" type="datetimeFigureOut">
               <a:rPr lang="en-US" smtClean="0"/>
               <a:pPr/>
-              <a:t>8/3/2010</a:t>
+              <a:t>8/17/2010</a:t>
             </a:fld>
             <a:endParaRPr lang="en-US"/>
           </a:p>
@@ -456,7 +456,7 @@
             <a:fld id="{77CFC0F2-488D-422B-ADC0-4A8D12F54259}" type="datetimeFigureOut">
               <a:rPr lang="en-US" smtClean="0"/>
               <a:pPr/>
-              <a:t>8/3/2010</a:t>
+              <a:t>8/17/2010</a:t>
             </a:fld>
             <a:endParaRPr lang="en-US"/>
           </a:p>
@@ -633,7 +633,7 @@
             <a:fld id="{77CFC0F2-488D-422B-ADC0-4A8D12F54259}" type="datetimeFigureOut">
               <a:rPr lang="en-US" smtClean="0"/>
               <a:pPr/>
-              <a:t>8/3/2010</a:t>
+              <a:t>8/17/2010</a:t>
             </a:fld>
             <a:endParaRPr lang="en-US"/>
           </a:p>
@@ -800,7 +800,7 @@
             <a:fld id="{77CFC0F2-488D-422B-ADC0-4A8D12F54259}" type="datetimeFigureOut">
               <a:rPr lang="en-US" smtClean="0"/>
               <a:pPr/>
-              <a:t>8/3/2010</a:t>
+              <a:t>8/17/2010</a:t>
             </a:fld>
             <a:endParaRPr lang="en-US"/>
           </a:p>
@@ -1043,7 +1043,7 @@
             <a:fld id="{77CFC0F2-488D-422B-ADC0-4A8D12F54259}" type="datetimeFigureOut">
               <a:rPr lang="en-US" smtClean="0"/>
               <a:pPr/>
-              <a:t>8/3/2010</a:t>
+              <a:t>8/17/2010</a:t>
             </a:fld>
             <a:endParaRPr lang="en-US"/>
           </a:p>
@@ -1328,7 +1328,7 @@
             <a:fld id="{77CFC0F2-488D-422B-ADC0-4A8D12F54259}" type="datetimeFigureOut">
               <a:rPr lang="en-US" smtClean="0"/>
               <a:pPr/>
-              <a:t>8/3/2010</a:t>
+              <a:t>8/17/2010</a:t>
             </a:fld>
             <a:endParaRPr lang="en-US"/>
           </a:p>
@@ -1747,7 +1747,7 @@
             <a:fld id="{77CFC0F2-488D-422B-ADC0-4A8D12F54259}" type="datetimeFigureOut">
               <a:rPr lang="en-US" smtClean="0"/>
               <a:pPr/>
-              <a:t>8/3/2010</a:t>
+              <a:t>8/17/2010</a:t>
             </a:fld>
             <a:endParaRPr lang="en-US"/>
           </a:p>
@@ -1862,7 +1862,7 @@
             <a:fld id="{77CFC0F2-488D-422B-ADC0-4A8D12F54259}" type="datetimeFigureOut">
               <a:rPr lang="en-US" smtClean="0"/>
               <a:pPr/>
-              <a:t>8/3/2010</a:t>
+              <a:t>8/17/2010</a:t>
             </a:fld>
             <a:endParaRPr lang="en-US"/>
           </a:p>
@@ -1954,7 +1954,7 @@
             <a:fld id="{77CFC0F2-488D-422B-ADC0-4A8D12F54259}" type="datetimeFigureOut">
               <a:rPr lang="en-US" smtClean="0"/>
               <a:pPr/>
-              <a:t>8/3/2010</a:t>
+              <a:t>8/17/2010</a:t>
             </a:fld>
             <a:endParaRPr lang="en-US"/>
           </a:p>
@@ -2228,7 +2228,7 @@
             <a:fld id="{77CFC0F2-488D-422B-ADC0-4A8D12F54259}" type="datetimeFigureOut">
               <a:rPr lang="en-US" smtClean="0"/>
               <a:pPr/>
-              <a:t>8/3/2010</a:t>
+              <a:t>8/17/2010</a:t>
             </a:fld>
             <a:endParaRPr lang="en-US"/>
           </a:p>
@@ -2478,7 +2478,7 @@
             <a:fld id="{77CFC0F2-488D-422B-ADC0-4A8D12F54259}" type="datetimeFigureOut">
               <a:rPr lang="en-US" smtClean="0"/>
               <a:pPr/>
-              <a:t>8/3/2010</a:t>
+              <a:t>8/17/2010</a:t>
             </a:fld>
             <a:endParaRPr lang="en-US"/>
           </a:p>
@@ -2688,7 +2688,7 @@
             <a:fld id="{77CFC0F2-488D-422B-ADC0-4A8D12F54259}" type="datetimeFigureOut">
               <a:rPr lang="en-US" smtClean="0"/>
               <a:pPr/>
-              <a:t>8/3/2010</a:t>
+              <a:t>8/17/2010</a:t>
             </a:fld>
             <a:endParaRPr lang="en-US"/>
           </a:p>
@@ -3285,7 +3285,7 @@
                   </a:schemeClr>
                 </a:solidFill>
               </a:rPr>
-              <a:t>0.3.0</a:t>
+              <a:t>1.0.0</a:t>
             </a:r>
             <a:endParaRPr lang="en-US" sz="1050" dirty="0">
               <a:solidFill>

</xml_diff>

<commit_message>
Release: Updated number to 1.1.0
</commit_message>
<xml_diff>
--- a/ca.mcgill.cs.swevo.qualyzer/splash.pptx
+++ b/ca.mcgill.cs.swevo.qualyzer/splash.pptx
@@ -289,7 +289,7 @@
             <a:fld id="{77CFC0F2-488D-422B-ADC0-4A8D12F54259}" type="datetimeFigureOut">
               <a:rPr lang="en-US" smtClean="0"/>
               <a:pPr/>
-              <a:t>8/17/2010</a:t>
+              <a:t>9/2/2010</a:t>
             </a:fld>
             <a:endParaRPr lang="en-US"/>
           </a:p>
@@ -456,7 +456,7 @@
             <a:fld id="{77CFC0F2-488D-422B-ADC0-4A8D12F54259}" type="datetimeFigureOut">
               <a:rPr lang="en-US" smtClean="0"/>
               <a:pPr/>
-              <a:t>8/17/2010</a:t>
+              <a:t>9/2/2010</a:t>
             </a:fld>
             <a:endParaRPr lang="en-US"/>
           </a:p>
@@ -633,7 +633,7 @@
             <a:fld id="{77CFC0F2-488D-422B-ADC0-4A8D12F54259}" type="datetimeFigureOut">
               <a:rPr lang="en-US" smtClean="0"/>
               <a:pPr/>
-              <a:t>8/17/2010</a:t>
+              <a:t>9/2/2010</a:t>
             </a:fld>
             <a:endParaRPr lang="en-US"/>
           </a:p>
@@ -800,7 +800,7 @@
             <a:fld id="{77CFC0F2-488D-422B-ADC0-4A8D12F54259}" type="datetimeFigureOut">
               <a:rPr lang="en-US" smtClean="0"/>
               <a:pPr/>
-              <a:t>8/17/2010</a:t>
+              <a:t>9/2/2010</a:t>
             </a:fld>
             <a:endParaRPr lang="en-US"/>
           </a:p>
@@ -1043,7 +1043,7 @@
             <a:fld id="{77CFC0F2-488D-422B-ADC0-4A8D12F54259}" type="datetimeFigureOut">
               <a:rPr lang="en-US" smtClean="0"/>
               <a:pPr/>
-              <a:t>8/17/2010</a:t>
+              <a:t>9/2/2010</a:t>
             </a:fld>
             <a:endParaRPr lang="en-US"/>
           </a:p>
@@ -1328,7 +1328,7 @@
             <a:fld id="{77CFC0F2-488D-422B-ADC0-4A8D12F54259}" type="datetimeFigureOut">
               <a:rPr lang="en-US" smtClean="0"/>
               <a:pPr/>
-              <a:t>8/17/2010</a:t>
+              <a:t>9/2/2010</a:t>
             </a:fld>
             <a:endParaRPr lang="en-US"/>
           </a:p>
@@ -1747,7 +1747,7 @@
             <a:fld id="{77CFC0F2-488D-422B-ADC0-4A8D12F54259}" type="datetimeFigureOut">
               <a:rPr lang="en-US" smtClean="0"/>
               <a:pPr/>
-              <a:t>8/17/2010</a:t>
+              <a:t>9/2/2010</a:t>
             </a:fld>
             <a:endParaRPr lang="en-US"/>
           </a:p>
@@ -1862,7 +1862,7 @@
             <a:fld id="{77CFC0F2-488D-422B-ADC0-4A8D12F54259}" type="datetimeFigureOut">
               <a:rPr lang="en-US" smtClean="0"/>
               <a:pPr/>
-              <a:t>8/17/2010</a:t>
+              <a:t>9/2/2010</a:t>
             </a:fld>
             <a:endParaRPr lang="en-US"/>
           </a:p>
@@ -1954,7 +1954,7 @@
             <a:fld id="{77CFC0F2-488D-422B-ADC0-4A8D12F54259}" type="datetimeFigureOut">
               <a:rPr lang="en-US" smtClean="0"/>
               <a:pPr/>
-              <a:t>8/17/2010</a:t>
+              <a:t>9/2/2010</a:t>
             </a:fld>
             <a:endParaRPr lang="en-US"/>
           </a:p>
@@ -2228,7 +2228,7 @@
             <a:fld id="{77CFC0F2-488D-422B-ADC0-4A8D12F54259}" type="datetimeFigureOut">
               <a:rPr lang="en-US" smtClean="0"/>
               <a:pPr/>
-              <a:t>8/17/2010</a:t>
+              <a:t>9/2/2010</a:t>
             </a:fld>
             <a:endParaRPr lang="en-US"/>
           </a:p>
@@ -2478,7 +2478,7 @@
             <a:fld id="{77CFC0F2-488D-422B-ADC0-4A8D12F54259}" type="datetimeFigureOut">
               <a:rPr lang="en-US" smtClean="0"/>
               <a:pPr/>
-              <a:t>8/17/2010</a:t>
+              <a:t>9/2/2010</a:t>
             </a:fld>
             <a:endParaRPr lang="en-US"/>
           </a:p>
@@ -2688,7 +2688,7 @@
             <a:fld id="{77CFC0F2-488D-422B-ADC0-4A8D12F54259}" type="datetimeFigureOut">
               <a:rPr lang="en-US" smtClean="0"/>
               <a:pPr/>
-              <a:t>8/17/2010</a:t>
+              <a:t>9/2/2010</a:t>
             </a:fld>
             <a:endParaRPr lang="en-US"/>
           </a:p>
@@ -3285,7 +3285,7 @@
                   </a:schemeClr>
                 </a:solidFill>
               </a:rPr>
-              <a:t>1.0.0</a:t>
+              <a:t>1.1.0</a:t>
             </a:r>
             <a:endParaRPr lang="en-US" sz="1050" dirty="0">
               <a:solidFill>

</xml_diff>

<commit_message>
refs #101 Changed the report dialog message. Updated the release number to 1.1.1.
</commit_message>
<xml_diff>
--- a/ca.mcgill.cs.swevo.qualyzer/splash.pptx
+++ b/ca.mcgill.cs.swevo.qualyzer/splash.pptx
@@ -289,7 +289,7 @@
             <a:fld id="{77CFC0F2-488D-422B-ADC0-4A8D12F54259}" type="datetimeFigureOut">
               <a:rPr lang="en-US" smtClean="0"/>
               <a:pPr/>
-              <a:t>9/2/2010</a:t>
+              <a:t>10/2/2010</a:t>
             </a:fld>
             <a:endParaRPr lang="en-US"/>
           </a:p>
@@ -456,7 +456,7 @@
             <a:fld id="{77CFC0F2-488D-422B-ADC0-4A8D12F54259}" type="datetimeFigureOut">
               <a:rPr lang="en-US" smtClean="0"/>
               <a:pPr/>
-              <a:t>9/2/2010</a:t>
+              <a:t>10/2/2010</a:t>
             </a:fld>
             <a:endParaRPr lang="en-US"/>
           </a:p>
@@ -633,7 +633,7 @@
             <a:fld id="{77CFC0F2-488D-422B-ADC0-4A8D12F54259}" type="datetimeFigureOut">
               <a:rPr lang="en-US" smtClean="0"/>
               <a:pPr/>
-              <a:t>9/2/2010</a:t>
+              <a:t>10/2/2010</a:t>
             </a:fld>
             <a:endParaRPr lang="en-US"/>
           </a:p>
@@ -800,7 +800,7 @@
             <a:fld id="{77CFC0F2-488D-422B-ADC0-4A8D12F54259}" type="datetimeFigureOut">
               <a:rPr lang="en-US" smtClean="0"/>
               <a:pPr/>
-              <a:t>9/2/2010</a:t>
+              <a:t>10/2/2010</a:t>
             </a:fld>
             <a:endParaRPr lang="en-US"/>
           </a:p>
@@ -1043,7 +1043,7 @@
             <a:fld id="{77CFC0F2-488D-422B-ADC0-4A8D12F54259}" type="datetimeFigureOut">
               <a:rPr lang="en-US" smtClean="0"/>
               <a:pPr/>
-              <a:t>9/2/2010</a:t>
+              <a:t>10/2/2010</a:t>
             </a:fld>
             <a:endParaRPr lang="en-US"/>
           </a:p>
@@ -1328,7 +1328,7 @@
             <a:fld id="{77CFC0F2-488D-422B-ADC0-4A8D12F54259}" type="datetimeFigureOut">
               <a:rPr lang="en-US" smtClean="0"/>
               <a:pPr/>
-              <a:t>9/2/2010</a:t>
+              <a:t>10/2/2010</a:t>
             </a:fld>
             <a:endParaRPr lang="en-US"/>
           </a:p>
@@ -1747,7 +1747,7 @@
             <a:fld id="{77CFC0F2-488D-422B-ADC0-4A8D12F54259}" type="datetimeFigureOut">
               <a:rPr lang="en-US" smtClean="0"/>
               <a:pPr/>
-              <a:t>9/2/2010</a:t>
+              <a:t>10/2/2010</a:t>
             </a:fld>
             <a:endParaRPr lang="en-US"/>
           </a:p>
@@ -1862,7 +1862,7 @@
             <a:fld id="{77CFC0F2-488D-422B-ADC0-4A8D12F54259}" type="datetimeFigureOut">
               <a:rPr lang="en-US" smtClean="0"/>
               <a:pPr/>
-              <a:t>9/2/2010</a:t>
+              <a:t>10/2/2010</a:t>
             </a:fld>
             <a:endParaRPr lang="en-US"/>
           </a:p>
@@ -1954,7 +1954,7 @@
             <a:fld id="{77CFC0F2-488D-422B-ADC0-4A8D12F54259}" type="datetimeFigureOut">
               <a:rPr lang="en-US" smtClean="0"/>
               <a:pPr/>
-              <a:t>9/2/2010</a:t>
+              <a:t>10/2/2010</a:t>
             </a:fld>
             <a:endParaRPr lang="en-US"/>
           </a:p>
@@ -2228,7 +2228,7 @@
             <a:fld id="{77CFC0F2-488D-422B-ADC0-4A8D12F54259}" type="datetimeFigureOut">
               <a:rPr lang="en-US" smtClean="0"/>
               <a:pPr/>
-              <a:t>9/2/2010</a:t>
+              <a:t>10/2/2010</a:t>
             </a:fld>
             <a:endParaRPr lang="en-US"/>
           </a:p>
@@ -2478,7 +2478,7 @@
             <a:fld id="{77CFC0F2-488D-422B-ADC0-4A8D12F54259}" type="datetimeFigureOut">
               <a:rPr lang="en-US" smtClean="0"/>
               <a:pPr/>
-              <a:t>9/2/2010</a:t>
+              <a:t>10/2/2010</a:t>
             </a:fld>
             <a:endParaRPr lang="en-US"/>
           </a:p>
@@ -2688,7 +2688,7 @@
             <a:fld id="{77CFC0F2-488D-422B-ADC0-4A8D12F54259}" type="datetimeFigureOut">
               <a:rPr lang="en-US" smtClean="0"/>
               <a:pPr/>
-              <a:t>9/2/2010</a:t>
+              <a:t>10/2/2010</a:t>
             </a:fld>
             <a:endParaRPr lang="en-US"/>
           </a:p>
@@ -3073,14 +3073,10 @@
           <a:prstGeom prst="rect">
             <a:avLst/>
           </a:prstGeom>
-          <a:effectLst>
-            <a:outerShdw blurRad="40000" dist="20000" dir="5400000" rotWithShape="0">
-              <a:srgbClr val="000000">
-                <a:alpha val="38000"/>
-              </a:srgbClr>
-            </a:outerShdw>
-            <a:softEdge rad="63500"/>
-          </a:effectLst>
+          <a:ln>
+            <a:noFill/>
+          </a:ln>
+          <a:effectLst/>
         </p:spPr>
         <p:style>
           <a:lnRef idx="1">
@@ -3252,7 +3248,7 @@
         <p:spPr>
           <a:xfrm>
             <a:off x="4448015" y="3115160"/>
-            <a:ext cx="946093" cy="261610"/>
+            <a:ext cx="912429" cy="253916"/>
           </a:xfrm>
           <a:prstGeom prst="rect">
             <a:avLst/>
@@ -3285,7 +3281,7 @@
                   </a:schemeClr>
                 </a:solidFill>
               </a:rPr>
-              <a:t>1.1.0</a:t>
+              <a:t>1.1.1</a:t>
             </a:r>
             <a:endParaRPr lang="en-US" sz="1050" dirty="0">
               <a:solidFill>

</xml_diff>

<commit_message>
Release: Preparation for version 1.1.2: splash and version numers in plugin manifest and dialogs.
</commit_message>
<xml_diff>
--- a/ca.mcgill.cs.swevo.qualyzer/splash.pptx
+++ b/ca.mcgill.cs.swevo.qualyzer/splash.pptx
@@ -289,7 +289,7 @@
             <a:fld id="{77CFC0F2-488D-422B-ADC0-4A8D12F54259}" type="datetimeFigureOut">
               <a:rPr lang="en-US" smtClean="0"/>
               <a:pPr/>
-              <a:t>10/2/2010</a:t>
+              <a:t>12/7/2010</a:t>
             </a:fld>
             <a:endParaRPr lang="en-US"/>
           </a:p>
@@ -456,7 +456,7 @@
             <a:fld id="{77CFC0F2-488D-422B-ADC0-4A8D12F54259}" type="datetimeFigureOut">
               <a:rPr lang="en-US" smtClean="0"/>
               <a:pPr/>
-              <a:t>10/2/2010</a:t>
+              <a:t>12/7/2010</a:t>
             </a:fld>
             <a:endParaRPr lang="en-US"/>
           </a:p>
@@ -633,7 +633,7 @@
             <a:fld id="{77CFC0F2-488D-422B-ADC0-4A8D12F54259}" type="datetimeFigureOut">
               <a:rPr lang="en-US" smtClean="0"/>
               <a:pPr/>
-              <a:t>10/2/2010</a:t>
+              <a:t>12/7/2010</a:t>
             </a:fld>
             <a:endParaRPr lang="en-US"/>
           </a:p>
@@ -800,7 +800,7 @@
             <a:fld id="{77CFC0F2-488D-422B-ADC0-4A8D12F54259}" type="datetimeFigureOut">
               <a:rPr lang="en-US" smtClean="0"/>
               <a:pPr/>
-              <a:t>10/2/2010</a:t>
+              <a:t>12/7/2010</a:t>
             </a:fld>
             <a:endParaRPr lang="en-US"/>
           </a:p>
@@ -1043,7 +1043,7 @@
             <a:fld id="{77CFC0F2-488D-422B-ADC0-4A8D12F54259}" type="datetimeFigureOut">
               <a:rPr lang="en-US" smtClean="0"/>
               <a:pPr/>
-              <a:t>10/2/2010</a:t>
+              <a:t>12/7/2010</a:t>
             </a:fld>
             <a:endParaRPr lang="en-US"/>
           </a:p>
@@ -1328,7 +1328,7 @@
             <a:fld id="{77CFC0F2-488D-422B-ADC0-4A8D12F54259}" type="datetimeFigureOut">
               <a:rPr lang="en-US" smtClean="0"/>
               <a:pPr/>
-              <a:t>10/2/2010</a:t>
+              <a:t>12/7/2010</a:t>
             </a:fld>
             <a:endParaRPr lang="en-US"/>
           </a:p>
@@ -1747,7 +1747,7 @@
             <a:fld id="{77CFC0F2-488D-422B-ADC0-4A8D12F54259}" type="datetimeFigureOut">
               <a:rPr lang="en-US" smtClean="0"/>
               <a:pPr/>
-              <a:t>10/2/2010</a:t>
+              <a:t>12/7/2010</a:t>
             </a:fld>
             <a:endParaRPr lang="en-US"/>
           </a:p>
@@ -1862,7 +1862,7 @@
             <a:fld id="{77CFC0F2-488D-422B-ADC0-4A8D12F54259}" type="datetimeFigureOut">
               <a:rPr lang="en-US" smtClean="0"/>
               <a:pPr/>
-              <a:t>10/2/2010</a:t>
+              <a:t>12/7/2010</a:t>
             </a:fld>
             <a:endParaRPr lang="en-US"/>
           </a:p>
@@ -1954,7 +1954,7 @@
             <a:fld id="{77CFC0F2-488D-422B-ADC0-4A8D12F54259}" type="datetimeFigureOut">
               <a:rPr lang="en-US" smtClean="0"/>
               <a:pPr/>
-              <a:t>10/2/2010</a:t>
+              <a:t>12/7/2010</a:t>
             </a:fld>
             <a:endParaRPr lang="en-US"/>
           </a:p>
@@ -2228,7 +2228,7 @@
             <a:fld id="{77CFC0F2-488D-422B-ADC0-4A8D12F54259}" type="datetimeFigureOut">
               <a:rPr lang="en-US" smtClean="0"/>
               <a:pPr/>
-              <a:t>10/2/2010</a:t>
+              <a:t>12/7/2010</a:t>
             </a:fld>
             <a:endParaRPr lang="en-US"/>
           </a:p>
@@ -2478,7 +2478,7 @@
             <a:fld id="{77CFC0F2-488D-422B-ADC0-4A8D12F54259}" type="datetimeFigureOut">
               <a:rPr lang="en-US" smtClean="0"/>
               <a:pPr/>
-              <a:t>10/2/2010</a:t>
+              <a:t>12/7/2010</a:t>
             </a:fld>
             <a:endParaRPr lang="en-US"/>
           </a:p>
@@ -2688,7 +2688,7 @@
             <a:fld id="{77CFC0F2-488D-422B-ADC0-4A8D12F54259}" type="datetimeFigureOut">
               <a:rPr lang="en-US" smtClean="0"/>
               <a:pPr/>
-              <a:t>10/2/2010</a:t>
+              <a:t>12/7/2010</a:t>
             </a:fld>
             <a:endParaRPr lang="en-US"/>
           </a:p>
@@ -3262,7 +3262,7 @@
           <a:lstStyle/>
           <a:p>
             <a:r>
-              <a:rPr lang="en-US" sz="1050" dirty="0" smtClean="0">
+              <a:rPr lang="en-US" sz="1050" smtClean="0">
                 <a:solidFill>
                   <a:schemeClr val="tx1">
                     <a:lumMod val="65000"/>
@@ -3273,7 +3273,7 @@
               <a:t>Release </a:t>
             </a:r>
             <a:r>
-              <a:rPr lang="en-US" sz="1050" dirty="0" smtClean="0">
+              <a:rPr lang="en-US" sz="1050" smtClean="0">
                 <a:solidFill>
                   <a:schemeClr val="tx1">
                     <a:lumMod val="65000"/>
@@ -3281,7 +3281,7 @@
                   </a:schemeClr>
                 </a:solidFill>
               </a:rPr>
-              <a:t>1.1.1</a:t>
+              <a:t>1.1.2</a:t>
             </a:r>
             <a:endParaRPr lang="en-US" sz="1050" dirty="0">
               <a:solidFill>

</xml_diff>